<commit_message>
refactor: change config after bha's discussion
</commit_message>
<xml_diff>
--- a/doc/domain_driven_design.pptx
+++ b/doc/domain_driven_design.pptx
@@ -243,7 +243,7 @@
           <a:p>
             <a:fld id="{10CA7C9F-D70A-6C4B-9D42-2AD6C8B64DBA}" type="datetimeFigureOut">
               <a:rPr lang="en-US" smtClean="0"/>
-              <a:t>6/9/16</a:t>
+              <a:t>2/9/17</a:t>
             </a:fld>
             <a:endParaRPr lang="en-US"/>
           </a:p>
@@ -413,7 +413,7 @@
           <a:p>
             <a:fld id="{10CA7C9F-D70A-6C4B-9D42-2AD6C8B64DBA}" type="datetimeFigureOut">
               <a:rPr lang="en-US" smtClean="0"/>
-              <a:t>6/9/16</a:t>
+              <a:t>2/9/17</a:t>
             </a:fld>
             <a:endParaRPr lang="en-US"/>
           </a:p>
@@ -593,7 +593,7 @@
           <a:p>
             <a:fld id="{10CA7C9F-D70A-6C4B-9D42-2AD6C8B64DBA}" type="datetimeFigureOut">
               <a:rPr lang="en-US" smtClean="0"/>
-              <a:t>6/9/16</a:t>
+              <a:t>2/9/17</a:t>
             </a:fld>
             <a:endParaRPr lang="en-US"/>
           </a:p>
@@ -763,7 +763,7 @@
           <a:p>
             <a:fld id="{10CA7C9F-D70A-6C4B-9D42-2AD6C8B64DBA}" type="datetimeFigureOut">
               <a:rPr lang="en-US" smtClean="0"/>
-              <a:t>6/9/16</a:t>
+              <a:t>2/9/17</a:t>
             </a:fld>
             <a:endParaRPr lang="en-US"/>
           </a:p>
@@ -1007,7 +1007,7 @@
           <a:p>
             <a:fld id="{10CA7C9F-D70A-6C4B-9D42-2AD6C8B64DBA}" type="datetimeFigureOut">
               <a:rPr lang="en-US" smtClean="0"/>
-              <a:t>6/9/16</a:t>
+              <a:t>2/9/17</a:t>
             </a:fld>
             <a:endParaRPr lang="en-US"/>
           </a:p>
@@ -1239,7 +1239,7 @@
           <a:p>
             <a:fld id="{10CA7C9F-D70A-6C4B-9D42-2AD6C8B64DBA}" type="datetimeFigureOut">
               <a:rPr lang="en-US" smtClean="0"/>
-              <a:t>6/9/16</a:t>
+              <a:t>2/9/17</a:t>
             </a:fld>
             <a:endParaRPr lang="en-US"/>
           </a:p>
@@ -1606,7 +1606,7 @@
           <a:p>
             <a:fld id="{10CA7C9F-D70A-6C4B-9D42-2AD6C8B64DBA}" type="datetimeFigureOut">
               <a:rPr lang="en-US" smtClean="0"/>
-              <a:t>6/9/16</a:t>
+              <a:t>2/9/17</a:t>
             </a:fld>
             <a:endParaRPr lang="en-US"/>
           </a:p>
@@ -1724,7 +1724,7 @@
           <a:p>
             <a:fld id="{10CA7C9F-D70A-6C4B-9D42-2AD6C8B64DBA}" type="datetimeFigureOut">
               <a:rPr lang="en-US" smtClean="0"/>
-              <a:t>6/9/16</a:t>
+              <a:t>2/9/17</a:t>
             </a:fld>
             <a:endParaRPr lang="en-US"/>
           </a:p>
@@ -1819,7 +1819,7 @@
           <a:p>
             <a:fld id="{10CA7C9F-D70A-6C4B-9D42-2AD6C8B64DBA}" type="datetimeFigureOut">
               <a:rPr lang="en-US" smtClean="0"/>
-              <a:t>6/9/16</a:t>
+              <a:t>2/9/17</a:t>
             </a:fld>
             <a:endParaRPr lang="en-US"/>
           </a:p>
@@ -2096,7 +2096,7 @@
           <a:p>
             <a:fld id="{10CA7C9F-D70A-6C4B-9D42-2AD6C8B64DBA}" type="datetimeFigureOut">
               <a:rPr lang="en-US" smtClean="0"/>
-              <a:t>6/9/16</a:t>
+              <a:t>2/9/17</a:t>
             </a:fld>
             <a:endParaRPr lang="en-US"/>
           </a:p>
@@ -2353,7 +2353,7 @@
           <a:p>
             <a:fld id="{10CA7C9F-D70A-6C4B-9D42-2AD6C8B64DBA}" type="datetimeFigureOut">
               <a:rPr lang="en-US" smtClean="0"/>
-              <a:t>6/9/16</a:t>
+              <a:t>2/9/17</a:t>
             </a:fld>
             <a:endParaRPr lang="en-US"/>
           </a:p>
@@ -2566,7 +2566,7 @@
           <a:p>
             <a:fld id="{10CA7C9F-D70A-6C4B-9D42-2AD6C8B64DBA}" type="datetimeFigureOut">
               <a:rPr lang="en-US" smtClean="0"/>
-              <a:t>6/9/16</a:t>
+              <a:t>2/9/17</a:t>
             </a:fld>
             <a:endParaRPr lang="en-US"/>
           </a:p>
@@ -3019,8 +3019,8 @@
         </p:nvSpPr>
         <p:spPr>
           <a:xfrm>
-            <a:off x="437321" y="2378764"/>
-            <a:ext cx="5903843" cy="3138240"/>
+            <a:off x="437321" y="2020955"/>
+            <a:ext cx="5903843" cy="4015016"/>
           </a:xfrm>
           <a:prstGeom prst="rect">
             <a:avLst/>
@@ -3147,7 +3147,7 @@
         </p:nvSpPr>
         <p:spPr>
           <a:xfrm>
-            <a:off x="437320" y="2378764"/>
+            <a:off x="437315" y="2202362"/>
             <a:ext cx="5903843" cy="369332"/>
           </a:xfrm>
           <a:prstGeom prst="rect">
@@ -3225,7 +3225,7 @@
         </p:nvSpPr>
         <p:spPr>
           <a:xfrm>
-            <a:off x="556586" y="3849754"/>
+            <a:off x="556586" y="3611124"/>
             <a:ext cx="5665307" cy="647629"/>
           </a:xfrm>
           <a:prstGeom prst="rect">
@@ -3329,7 +3329,7 @@
         </p:nvSpPr>
         <p:spPr>
           <a:xfrm>
-            <a:off x="556585" y="3048863"/>
+            <a:off x="556585" y="2810233"/>
             <a:ext cx="5665307" cy="647629"/>
           </a:xfrm>
           <a:prstGeom prst="rect">
@@ -3415,7 +3415,11 @@
             <a:pPr algn="ctr"/>
             <a:r>
               <a:rPr lang="en-US" dirty="0" smtClean="0"/>
-              <a:t>Cleaning</a:t>
+              <a:t>Technical cleaning (encoding</a:t>
+            </a:r>
+            <a:r>
+              <a:rPr lang="en-US" smtClean="0"/>
+              <a:t>, misspelling errors, etc.)</a:t>
             </a:r>
             <a:endParaRPr lang="en-US" dirty="0"/>
           </a:p>
@@ -3429,7 +3433,7 @@
         </p:nvSpPr>
         <p:spPr>
           <a:xfrm>
-            <a:off x="556582" y="4648487"/>
+            <a:off x="556582" y="4409857"/>
             <a:ext cx="5665307" cy="647629"/>
           </a:xfrm>
           <a:prstGeom prst="rect">
@@ -3466,6 +3470,64 @@
             <a:r>
               <a:rPr lang="en-US" smtClean="0"/>
               <a:t>Engineering</a:t>
+            </a:r>
+            <a:endParaRPr lang="en-US" dirty="0"/>
+          </a:p>
+        </p:txBody>
+      </p:sp>
+      <p:sp>
+        <p:nvSpPr>
+          <p:cNvPr id="13" name="Rectangle 12"/>
+          <p:cNvSpPr/>
+          <p:nvPr/>
+        </p:nvSpPr>
+        <p:spPr>
+          <a:xfrm>
+            <a:off x="556584" y="5233494"/>
+            <a:ext cx="5665307" cy="647629"/>
+          </a:xfrm>
+          <a:prstGeom prst="rect">
+            <a:avLst/>
+          </a:prstGeom>
+          <a:solidFill>
+            <a:schemeClr val="accent2"/>
+          </a:solidFill>
+          <a:ln>
+            <a:noFill/>
+          </a:ln>
+        </p:spPr>
+        <p:style>
+          <a:lnRef idx="2">
+            <a:schemeClr val="accent1">
+              <a:shade val="50000"/>
+            </a:schemeClr>
+          </a:lnRef>
+          <a:fillRef idx="1">
+            <a:schemeClr val="accent1"/>
+          </a:fillRef>
+          <a:effectRef idx="0">
+            <a:schemeClr val="accent1"/>
+          </a:effectRef>
+          <a:fontRef idx="minor">
+            <a:schemeClr val="lt1"/>
+          </a:fontRef>
+        </p:style>
+        <p:txBody>
+          <a:bodyPr rtlCol="0" anchor="ctr"/>
+          <a:lstStyle/>
+          <a:p>
+            <a:pPr algn="ctr"/>
+            <a:r>
+              <a:rPr lang="en-US" dirty="0" smtClean="0"/>
+              <a:t>Domain cleaning (discard values, </a:t>
+            </a:r>
+            <a:r>
+              <a:rPr lang="en-US" dirty="0" err="1" smtClean="0"/>
+              <a:t>fillna</a:t>
+            </a:r>
+            <a:r>
+              <a:rPr lang="en-US" dirty="0" smtClean="0"/>
+              <a:t>, etc.)</a:t>
             </a:r>
             <a:endParaRPr lang="en-US" dirty="0"/>
           </a:p>

</xml_diff>